<commit_message>
final ppt for presentation tonight
</commit_message>
<xml_diff>
--- a/grp7_Changes.pptx
+++ b/grp7_Changes.pptx
@@ -435,11 +435,11 @@
           <c:showBubbleSize val="0"/>
         </c:dLbls>
         <c:smooth val="0"/>
-        <c:axId val="-109116064"/>
-        <c:axId val="-38762144"/>
+        <c:axId val="466588112"/>
+        <c:axId val="466197920"/>
       </c:lineChart>
       <c:catAx>
-        <c:axId val="-109116064"/>
+        <c:axId val="466588112"/>
         <c:scaling>
           <c:orientation val="minMax"/>
         </c:scaling>
@@ -482,7 +482,7 @@
             <a:endParaRPr lang="en-US"/>
           </a:p>
         </c:txPr>
-        <c:crossAx val="-38762144"/>
+        <c:crossAx val="466197920"/>
         <c:crosses val="autoZero"/>
         <c:auto val="1"/>
         <c:lblAlgn val="ctr"/>
@@ -490,12 +490,13 @@
         <c:noMultiLvlLbl val="0"/>
       </c:catAx>
       <c:valAx>
-        <c:axId val="-38762144"/>
+        <c:axId val="466197920"/>
         <c:scaling>
           <c:orientation val="minMax"/>
         </c:scaling>
         <c:delete val="0"/>
         <c:axPos val="l"/>
+        <c:numFmt formatCode="General" sourceLinked="0"/>
         <c:majorTickMark val="none"/>
         <c:minorTickMark val="none"/>
         <c:tickLblPos val="nextTo"/>
@@ -526,7 +527,7 @@
             <a:endParaRPr lang="en-US"/>
           </a:p>
         </c:txPr>
-        <c:crossAx val="-109116064"/>
+        <c:crossAx val="466588112"/>
         <c:crosses val="autoZero"/>
         <c:crossBetween val="between"/>
       </c:valAx>
@@ -584,6 +585,7 @@
   </mc:AlternateContent>
   <c:chart>
     <c:title>
+      <c:layout/>
       <c:overlay val="0"/>
       <c:spPr>
         <a:noFill/>
@@ -620,8 +622,8 @@
           <c:layoutTarget val="inner"/>
           <c:xMode val="edge"/>
           <c:yMode val="edge"/>
-          <c:x val="0.0719628277145837"/>
-          <c:y val="0.215010845263969"/>
+          <c:x val="0.166955669490723"/>
+          <c:y val="0.215010750465064"/>
           <c:w val="0.750506598335554"/>
           <c:h val="0.498147773107006"/>
         </c:manualLayout>
@@ -725,11 +727,11 @@
           <c:showBubbleSize val="0"/>
         </c:dLbls>
         <c:smooth val="0"/>
-        <c:axId val="108130336"/>
-        <c:axId val="108132112"/>
+        <c:axId val="540137920"/>
+        <c:axId val="540140672"/>
       </c:lineChart>
       <c:catAx>
-        <c:axId val="108130336"/>
+        <c:axId val="540137920"/>
         <c:scaling>
           <c:orientation val="minMax"/>
         </c:scaling>
@@ -772,7 +774,7 @@
             <a:endParaRPr lang="en-US"/>
           </a:p>
         </c:txPr>
-        <c:crossAx val="108132112"/>
+        <c:crossAx val="540140672"/>
         <c:crosses val="autoZero"/>
         <c:auto val="1"/>
         <c:lblAlgn val="ctr"/>
@@ -780,7 +782,7 @@
         <c:noMultiLvlLbl val="0"/>
       </c:catAx>
       <c:valAx>
-        <c:axId val="108132112"/>
+        <c:axId val="540140672"/>
         <c:scaling>
           <c:orientation val="minMax"/>
         </c:scaling>
@@ -816,7 +818,7 @@
             <a:endParaRPr lang="en-US"/>
           </a:p>
         </c:txPr>
-        <c:crossAx val="108130336"/>
+        <c:crossAx val="540137920"/>
         <c:crosses val="autoZero"/>
         <c:crossBetween val="between"/>
       </c:valAx>
@@ -830,47 +832,6 @@
         <a:effectLst/>
       </c:spPr>
     </c:plotArea>
-    <c:legend>
-      <c:legendPos val="r"/>
-      <c:layout>
-        <c:manualLayout>
-          <c:xMode val="edge"/>
-          <c:yMode val="edge"/>
-          <c:x val="0.824849669802091"/>
-          <c:y val="0.525918315073124"/>
-          <c:w val="0.156108380182278"/>
-          <c:h val="0.186179869436572"/>
-        </c:manualLayout>
-      </c:layout>
-      <c:overlay val="0"/>
-      <c:spPr>
-        <a:noFill/>
-        <a:ln>
-          <a:noFill/>
-        </a:ln>
-        <a:effectLst/>
-      </c:spPr>
-      <c:txPr>
-        <a:bodyPr rot="0" spcFirstLastPara="1" vertOverflow="ellipsis" vert="horz" wrap="square" anchor="ctr" anchorCtr="1"/>
-        <a:lstStyle/>
-        <a:p>
-          <a:pPr>
-            <a:defRPr sz="1197" b="0" i="0" u="none" strike="noStrike" kern="1200" baseline="0">
-              <a:solidFill>
-                <a:schemeClr val="tx1">
-                  <a:lumMod val="65000"/>
-                  <a:lumOff val="35000"/>
-                </a:schemeClr>
-              </a:solidFill>
-              <a:latin typeface="+mn-lt"/>
-              <a:ea typeface="+mn-ea"/>
-              <a:cs typeface="+mn-cs"/>
-            </a:defRPr>
-          </a:pPr>
-          <a:endParaRPr lang="en-US"/>
-        </a:p>
-      </c:txPr>
-    </c:legend>
     <c:plotVisOnly val="1"/>
     <c:dispBlanksAs val="gap"/>
     <c:showDLblsOverMax val="0"/>
@@ -945,6 +906,7 @@
           </a:p>
         </c:rich>
       </c:tx>
+      <c:layout/>
       <c:overlay val="0"/>
       <c:spPr>
         <a:noFill/>
@@ -1163,11 +1125,11 @@
           <c:showBubbleSize val="0"/>
         </c:dLbls>
         <c:smooth val="0"/>
-        <c:axId val="108005904"/>
-        <c:axId val="-33591200"/>
+        <c:axId val="539601392"/>
+        <c:axId val="539604144"/>
       </c:lineChart>
       <c:catAx>
-        <c:axId val="108005904"/>
+        <c:axId val="539601392"/>
         <c:scaling>
           <c:orientation val="minMax"/>
         </c:scaling>
@@ -1210,7 +1172,7 @@
             <a:endParaRPr lang="en-US"/>
           </a:p>
         </c:txPr>
-        <c:crossAx val="-33591200"/>
+        <c:crossAx val="539604144"/>
         <c:crosses val="autoZero"/>
         <c:auto val="1"/>
         <c:lblAlgn val="ctr"/>
@@ -1218,7 +1180,7 @@
         <c:noMultiLvlLbl val="0"/>
       </c:catAx>
       <c:valAx>
-        <c:axId val="-33591200"/>
+        <c:axId val="539604144"/>
         <c:scaling>
           <c:orientation val="minMax"/>
         </c:scaling>
@@ -1254,7 +1216,7 @@
             <a:endParaRPr lang="en-US"/>
           </a:p>
         </c:txPr>
-        <c:crossAx val="108005904"/>
+        <c:crossAx val="539601392"/>
         <c:crosses val="autoZero"/>
         <c:crossBetween val="between"/>
       </c:valAx>
@@ -1270,6 +1232,7 @@
     </c:plotArea>
     <c:legend>
       <c:legendPos val="b"/>
+      <c:layout/>
       <c:overlay val="0"/>
       <c:spPr>
         <a:noFill/>
@@ -1369,6 +1332,7 @@
           </a:p>
         </c:rich>
       </c:tx>
+      <c:layout/>
       <c:overlay val="0"/>
       <c:spPr>
         <a:noFill/>
@@ -1587,11 +1551,11 @@
           <c:showBubbleSize val="0"/>
         </c:dLbls>
         <c:smooth val="0"/>
-        <c:axId val="-33701568"/>
-        <c:axId val="-33703648"/>
+        <c:axId val="469253728"/>
+        <c:axId val="469256480"/>
       </c:lineChart>
       <c:catAx>
-        <c:axId val="-33701568"/>
+        <c:axId val="469253728"/>
         <c:scaling>
           <c:orientation val="minMax"/>
         </c:scaling>
@@ -1634,7 +1598,7 @@
             <a:endParaRPr lang="en-US"/>
           </a:p>
         </c:txPr>
-        <c:crossAx val="-33703648"/>
+        <c:crossAx val="469256480"/>
         <c:crosses val="autoZero"/>
         <c:auto val="1"/>
         <c:lblAlgn val="ctr"/>
@@ -1642,7 +1606,7 @@
         <c:noMultiLvlLbl val="0"/>
       </c:catAx>
       <c:valAx>
-        <c:axId val="-33703648"/>
+        <c:axId val="469256480"/>
         <c:scaling>
           <c:orientation val="minMax"/>
         </c:scaling>
@@ -1679,7 +1643,7 @@
             <a:endParaRPr lang="en-US"/>
           </a:p>
         </c:txPr>
-        <c:crossAx val="-33701568"/>
+        <c:crossAx val="469253728"/>
         <c:crosses val="autoZero"/>
         <c:crossBetween val="between"/>
       </c:valAx>
@@ -1695,6 +1659,7 @@
     </c:plotArea>
     <c:legend>
       <c:legendPos val="b"/>
+      <c:layout/>
       <c:overlay val="0"/>
       <c:spPr>
         <a:noFill/>
@@ -1909,11 +1874,11 @@
           <c:showBubbleSize val="0"/>
         </c:dLbls>
         <c:smooth val="0"/>
-        <c:axId val="108424640"/>
-        <c:axId val="108419632"/>
+        <c:axId val="510988080"/>
+        <c:axId val="539105584"/>
       </c:lineChart>
       <c:catAx>
-        <c:axId val="108424640"/>
+        <c:axId val="510988080"/>
         <c:scaling>
           <c:orientation val="minMax"/>
         </c:scaling>
@@ -1956,7 +1921,7 @@
             <a:endParaRPr lang="en-US"/>
           </a:p>
         </c:txPr>
-        <c:crossAx val="108419632"/>
+        <c:crossAx val="539105584"/>
         <c:crosses val="autoZero"/>
         <c:auto val="1"/>
         <c:lblAlgn val="ctr"/>
@@ -1964,7 +1929,7 @@
         <c:noMultiLvlLbl val="0"/>
       </c:catAx>
       <c:valAx>
-        <c:axId val="108419632"/>
+        <c:axId val="539105584"/>
         <c:scaling>
           <c:orientation val="minMax"/>
         </c:scaling>
@@ -2000,7 +1965,7 @@
             <a:endParaRPr lang="en-US"/>
           </a:p>
         </c:txPr>
-        <c:crossAx val="108424640"/>
+        <c:crossAx val="510988080"/>
         <c:crosses val="autoZero"/>
         <c:crossBetween val="between"/>
       </c:valAx>
@@ -2199,11 +2164,11 @@
           <c:showBubbleSize val="0"/>
         </c:dLbls>
         <c:smooth val="0"/>
-        <c:axId val="17221440"/>
-        <c:axId val="-38978496"/>
+        <c:axId val="537594448"/>
+        <c:axId val="537578144"/>
       </c:lineChart>
       <c:catAx>
-        <c:axId val="17221440"/>
+        <c:axId val="537594448"/>
         <c:scaling>
           <c:orientation val="minMax"/>
         </c:scaling>
@@ -2246,7 +2211,7 @@
             <a:endParaRPr lang="en-US"/>
           </a:p>
         </c:txPr>
-        <c:crossAx val="-38978496"/>
+        <c:crossAx val="537578144"/>
         <c:crosses val="autoZero"/>
         <c:auto val="1"/>
         <c:lblAlgn val="ctr"/>
@@ -2254,7 +2219,7 @@
         <c:noMultiLvlLbl val="0"/>
       </c:catAx>
       <c:valAx>
-        <c:axId val="-38978496"/>
+        <c:axId val="537578144"/>
         <c:scaling>
           <c:orientation val="minMax"/>
         </c:scaling>
@@ -2290,7 +2255,7 @@
             <a:endParaRPr lang="en-US"/>
           </a:p>
         </c:txPr>
-        <c:crossAx val="17221440"/>
+        <c:crossAx val="537594448"/>
         <c:crosses val="autoZero"/>
         <c:crossBetween val="between"/>
       </c:valAx>
@@ -2489,11 +2454,11 @@
           <c:showBubbleSize val="0"/>
         </c:dLbls>
         <c:smooth val="0"/>
-        <c:axId val="108329456"/>
-        <c:axId val="108331504"/>
+        <c:axId val="468851008"/>
+        <c:axId val="468917376"/>
       </c:lineChart>
       <c:catAx>
-        <c:axId val="108329456"/>
+        <c:axId val="468851008"/>
         <c:scaling>
           <c:orientation val="minMax"/>
         </c:scaling>
@@ -2536,7 +2501,7 @@
             <a:endParaRPr lang="en-US"/>
           </a:p>
         </c:txPr>
-        <c:crossAx val="108331504"/>
+        <c:crossAx val="468917376"/>
         <c:crosses val="autoZero"/>
         <c:auto val="1"/>
         <c:lblAlgn val="ctr"/>
@@ -2544,7 +2509,7 @@
         <c:noMultiLvlLbl val="0"/>
       </c:catAx>
       <c:valAx>
-        <c:axId val="108331504"/>
+        <c:axId val="468917376"/>
         <c:scaling>
           <c:orientation val="minMax"/>
         </c:scaling>
@@ -2581,7 +2546,7 @@
             <a:endParaRPr lang="en-US"/>
           </a:p>
         </c:txPr>
-        <c:crossAx val="108329456"/>
+        <c:crossAx val="468851008"/>
         <c:crosses val="autoZero"/>
         <c:crossBetween val="between"/>
       </c:valAx>
@@ -2639,6 +2604,7 @@
   </mc:AlternateContent>
   <c:chart>
     <c:title>
+      <c:layout/>
       <c:overlay val="0"/>
       <c:spPr>
         <a:noFill/>
@@ -2780,11 +2746,11 @@
           <c:showBubbleSize val="0"/>
         </c:dLbls>
         <c:smooth val="0"/>
-        <c:axId val="108315808"/>
-        <c:axId val="108318128"/>
+        <c:axId val="468167728"/>
+        <c:axId val="468113920"/>
       </c:lineChart>
       <c:catAx>
-        <c:axId val="108315808"/>
+        <c:axId val="468167728"/>
         <c:scaling>
           <c:orientation val="minMax"/>
         </c:scaling>
@@ -2827,7 +2793,7 @@
             <a:endParaRPr lang="en-US"/>
           </a:p>
         </c:txPr>
-        <c:crossAx val="108318128"/>
+        <c:crossAx val="468113920"/>
         <c:crosses val="autoZero"/>
         <c:auto val="1"/>
         <c:lblAlgn val="ctr"/>
@@ -2835,7 +2801,7 @@
         <c:noMultiLvlLbl val="0"/>
       </c:catAx>
       <c:valAx>
-        <c:axId val="108318128"/>
+        <c:axId val="468113920"/>
         <c:scaling>
           <c:orientation val="minMax"/>
         </c:scaling>
@@ -2872,7 +2838,7 @@
             <a:endParaRPr lang="en-US"/>
           </a:p>
         </c:txPr>
-        <c:crossAx val="108315808"/>
+        <c:crossAx val="468167728"/>
         <c:crosses val="autoZero"/>
         <c:crossBetween val="between"/>
       </c:valAx>
@@ -2930,6 +2896,7 @@
   </mc:AlternateContent>
   <c:chart>
     <c:title>
+      <c:layout/>
       <c:overlay val="0"/>
       <c:spPr>
         <a:noFill/>
@@ -3071,11 +3038,11 @@
           <c:showBubbleSize val="0"/>
         </c:dLbls>
         <c:smooth val="0"/>
-        <c:axId val="108256640"/>
-        <c:axId val="108236784"/>
+        <c:axId val="511350736"/>
+        <c:axId val="511622688"/>
       </c:lineChart>
       <c:catAx>
-        <c:axId val="108256640"/>
+        <c:axId val="511350736"/>
         <c:scaling>
           <c:orientation val="minMax"/>
         </c:scaling>
@@ -3118,7 +3085,7 @@
             <a:endParaRPr lang="en-US"/>
           </a:p>
         </c:txPr>
-        <c:crossAx val="108236784"/>
+        <c:crossAx val="511622688"/>
         <c:crosses val="autoZero"/>
         <c:auto val="1"/>
         <c:lblAlgn val="ctr"/>
@@ -3126,7 +3093,7 @@
         <c:noMultiLvlLbl val="0"/>
       </c:catAx>
       <c:valAx>
-        <c:axId val="108236784"/>
+        <c:axId val="511622688"/>
         <c:scaling>
           <c:orientation val="minMax"/>
         </c:scaling>
@@ -3162,7 +3129,7 @@
             <a:endParaRPr lang="en-US"/>
           </a:p>
         </c:txPr>
-        <c:crossAx val="108256640"/>
+        <c:crossAx val="511350736"/>
         <c:crosses val="autoZero"/>
         <c:crossBetween val="between"/>
       </c:valAx>
@@ -3220,6 +3187,7 @@
   </mc:AlternateContent>
   <c:chart>
     <c:title>
+      <c:layout/>
       <c:overlay val="0"/>
       <c:spPr>
         <a:noFill/>
@@ -3357,11 +3325,11 @@
           <c:showBubbleSize val="0"/>
         </c:dLbls>
         <c:smooth val="0"/>
-        <c:axId val="108203840"/>
-        <c:axId val="108206160"/>
+        <c:axId val="469192576"/>
+        <c:axId val="469182960"/>
       </c:lineChart>
       <c:catAx>
-        <c:axId val="108203840"/>
+        <c:axId val="469192576"/>
         <c:scaling>
           <c:orientation val="minMax"/>
         </c:scaling>
@@ -3404,7 +3372,7 @@
             <a:endParaRPr lang="en-US"/>
           </a:p>
         </c:txPr>
-        <c:crossAx val="108206160"/>
+        <c:crossAx val="469182960"/>
         <c:crosses val="autoZero"/>
         <c:auto val="1"/>
         <c:lblAlgn val="ctr"/>
@@ -3412,7 +3380,7 @@
         <c:noMultiLvlLbl val="0"/>
       </c:catAx>
       <c:valAx>
-        <c:axId val="108206160"/>
+        <c:axId val="469182960"/>
         <c:scaling>
           <c:orientation val="minMax"/>
         </c:scaling>
@@ -3448,7 +3416,7 @@
             <a:endParaRPr lang="en-US"/>
           </a:p>
         </c:txPr>
-        <c:crossAx val="108203840"/>
+        <c:crossAx val="469192576"/>
         <c:crosses val="autoZero"/>
         <c:crossBetween val="between"/>
       </c:valAx>
@@ -3506,6 +3474,7 @@
   </mc:AlternateContent>
   <c:chart>
     <c:title>
+      <c:layout/>
       <c:overlay val="0"/>
       <c:spPr>
         <a:noFill/>
@@ -3643,11 +3612,11 @@
           <c:showBubbleSize val="0"/>
         </c:dLbls>
         <c:smooth val="0"/>
-        <c:axId val="108169776"/>
-        <c:axId val="108171824"/>
+        <c:axId val="511647376"/>
+        <c:axId val="511649696"/>
       </c:lineChart>
       <c:catAx>
-        <c:axId val="108169776"/>
+        <c:axId val="511647376"/>
         <c:scaling>
           <c:orientation val="minMax"/>
         </c:scaling>
@@ -3690,7 +3659,7 @@
             <a:endParaRPr lang="en-US"/>
           </a:p>
         </c:txPr>
-        <c:crossAx val="108171824"/>
+        <c:crossAx val="511649696"/>
         <c:crosses val="autoZero"/>
         <c:auto val="1"/>
         <c:lblAlgn val="ctr"/>
@@ -3698,7 +3667,7 @@
         <c:noMultiLvlLbl val="0"/>
       </c:catAx>
       <c:valAx>
-        <c:axId val="108171824"/>
+        <c:axId val="511649696"/>
         <c:scaling>
           <c:orientation val="minMax"/>
         </c:scaling>
@@ -3734,7 +3703,7 @@
             <a:endParaRPr lang="en-US"/>
           </a:p>
         </c:txPr>
-        <c:crossAx val="108169776"/>
+        <c:crossAx val="511647376"/>
         <c:crosses val="autoZero"/>
         <c:crossBetween val="between"/>
       </c:valAx>
@@ -3792,6 +3761,7 @@
   </mc:AlternateContent>
   <c:chart>
     <c:title>
+      <c:layout/>
       <c:overlay val="0"/>
       <c:spPr>
         <a:noFill/>
@@ -3828,8 +3798,8 @@
           <c:layoutTarget val="inner"/>
           <c:xMode val="edge"/>
           <c:yMode val="edge"/>
-          <c:x val="0.0719628277145837"/>
-          <c:y val="0.215010845263969"/>
+          <c:x val="0.125698111123523"/>
+          <c:y val="0.215010750465064"/>
           <c:w val="0.750506598335554"/>
           <c:h val="0.498147773107006"/>
         </c:manualLayout>
@@ -3933,11 +3903,11 @@
           <c:showBubbleSize val="0"/>
         </c:dLbls>
         <c:smooth val="0"/>
-        <c:axId val="108118400"/>
-        <c:axId val="108106464"/>
+        <c:axId val="540117728"/>
+        <c:axId val="540120480"/>
       </c:lineChart>
       <c:catAx>
-        <c:axId val="108118400"/>
+        <c:axId val="540117728"/>
         <c:scaling>
           <c:orientation val="minMax"/>
         </c:scaling>
@@ -3980,7 +3950,7 @@
             <a:endParaRPr lang="en-US"/>
           </a:p>
         </c:txPr>
-        <c:crossAx val="108106464"/>
+        <c:crossAx val="540120480"/>
         <c:crosses val="autoZero"/>
         <c:auto val="1"/>
         <c:lblAlgn val="ctr"/>
@@ -3988,7 +3958,7 @@
         <c:noMultiLvlLbl val="0"/>
       </c:catAx>
       <c:valAx>
-        <c:axId val="108106464"/>
+        <c:axId val="540120480"/>
         <c:scaling>
           <c:orientation val="minMax"/>
         </c:scaling>
@@ -4025,7 +3995,7 @@
             <a:endParaRPr lang="en-US"/>
           </a:p>
         </c:txPr>
-        <c:crossAx val="108118400"/>
+        <c:crossAx val="540117728"/>
         <c:crosses val="autoZero"/>
         <c:crossBetween val="between"/>
       </c:valAx>
@@ -4039,47 +4009,6 @@
         <a:effectLst/>
       </c:spPr>
     </c:plotArea>
-    <c:legend>
-      <c:legendPos val="r"/>
-      <c:layout>
-        <c:manualLayout>
-          <c:xMode val="edge"/>
-          <c:yMode val="edge"/>
-          <c:x val="0.824849669802091"/>
-          <c:y val="0.525918315073124"/>
-          <c:w val="0.156108380182278"/>
-          <c:h val="0.186179869436572"/>
-        </c:manualLayout>
-      </c:layout>
-      <c:overlay val="0"/>
-      <c:spPr>
-        <a:noFill/>
-        <a:ln>
-          <a:noFill/>
-        </a:ln>
-        <a:effectLst/>
-      </c:spPr>
-      <c:txPr>
-        <a:bodyPr rot="0" spcFirstLastPara="1" vertOverflow="ellipsis" vert="horz" wrap="square" anchor="ctr" anchorCtr="1"/>
-        <a:lstStyle/>
-        <a:p>
-          <a:pPr>
-            <a:defRPr sz="1197" b="0" i="0" u="none" strike="noStrike" kern="1200" baseline="0">
-              <a:solidFill>
-                <a:schemeClr val="tx1">
-                  <a:lumMod val="65000"/>
-                  <a:lumOff val="35000"/>
-                </a:schemeClr>
-              </a:solidFill>
-              <a:latin typeface="+mn-lt"/>
-              <a:ea typeface="+mn-ea"/>
-              <a:cs typeface="+mn-cs"/>
-            </a:defRPr>
-          </a:pPr>
-          <a:endParaRPr lang="en-US"/>
-        </a:p>
-      </c:txPr>
-    </c:legend>
     <c:plotVisOnly val="1"/>
     <c:dispBlanksAs val="gap"/>
     <c:showDLblsOverMax val="0"/>
@@ -11543,6 +11472,89 @@
 </file>
 
 <file path=ppt/notesSlides/notesSlide12.xml><?xml version="1.0" encoding="utf-8"?>
+<p:notes xmlns:a="http://schemas.openxmlformats.org/drawingml/2006/main" xmlns:r="http://schemas.openxmlformats.org/officeDocument/2006/relationships" xmlns:p="http://schemas.openxmlformats.org/presentationml/2006/main">
+  <p:cSld>
+    <p:spTree>
+      <p:nvGrpSpPr>
+        <p:cNvPr id="1" name=""/>
+        <p:cNvGrpSpPr/>
+        <p:nvPr/>
+      </p:nvGrpSpPr>
+      <p:grpSpPr>
+        <a:xfrm>
+          <a:off x="0" y="0"/>
+          <a:ext cx="0" cy="0"/>
+          <a:chOff x="0" y="0"/>
+          <a:chExt cx="0" cy="0"/>
+        </a:xfrm>
+      </p:grpSpPr>
+      <p:sp>
+        <p:nvSpPr>
+          <p:cNvPr id="2" name="Slide Image Placeholder 1"/>
+          <p:cNvSpPr>
+            <a:spLocks noGrp="1" noRot="1" noChangeAspect="1"/>
+          </p:cNvSpPr>
+          <p:nvPr>
+            <p:ph type="sldImg"/>
+          </p:nvPr>
+        </p:nvSpPr>
+        <p:spPr/>
+      </p:sp>
+      <p:sp>
+        <p:nvSpPr>
+          <p:cNvPr id="3" name="Notes Placeholder 2"/>
+          <p:cNvSpPr>
+            <a:spLocks noGrp="1"/>
+          </p:cNvSpPr>
+          <p:nvPr>
+            <p:ph type="body" idx="1"/>
+          </p:nvPr>
+        </p:nvSpPr>
+        <p:spPr/>
+        <p:txBody>
+          <a:bodyPr/>
+          <a:lstStyle/>
+          <a:p>
+            <a:r>
+              <a:rPr lang="en-US" dirty="0" smtClean="0"/>
+              <a:t>10 fold CV</a:t>
+            </a:r>
+            <a:r>
+              <a:rPr lang="en-US" baseline="0" dirty="0" smtClean="0"/>
+              <a:t> : </a:t>
+            </a:r>
+            <a:r>
+              <a:rPr lang="en-US" baseline="0" dirty="0" err="1" smtClean="0"/>
+              <a:t>seq</a:t>
+            </a:r>
+            <a:r>
+              <a:rPr lang="en-US" baseline="0" dirty="0" smtClean="0"/>
+              <a:t>(1,500) ; shrinkage: 0.1</a:t>
+            </a:r>
+          </a:p>
+          <a:p>
+            <a:r>
+              <a:rPr lang="en-US" baseline="0" dirty="0" smtClean="0"/>
+              <a:t>30 percent: test set</a:t>
+            </a:r>
+            <a:endParaRPr lang="en-US" dirty="0"/>
+          </a:p>
+        </p:txBody>
+      </p:sp>
+    </p:spTree>
+    <p:extLst>
+      <p:ext uri="{BB962C8B-B14F-4D97-AF65-F5344CB8AC3E}">
+        <p14:creationId xmlns:p14="http://schemas.microsoft.com/office/powerpoint/2010/main" val="143473460"/>
+      </p:ext>
+    </p:extLst>
+  </p:cSld>
+  <p:clrMapOvr>
+    <a:masterClrMapping/>
+  </p:clrMapOvr>
+</p:notes>
+</file>
+
+<file path=ppt/notesSlides/notesSlide13.xml><?xml version="1.0" encoding="utf-8"?>
 <p:notes xmlns:a="http://schemas.openxmlformats.org/drawingml/2006/main" xmlns:r="http://schemas.openxmlformats.org/officeDocument/2006/relationships" xmlns:p="http://schemas.openxmlformats.org/presentationml/2006/main" showMasterSp="0" showMasterPhAnim="0">
   <p:cSld>
     <p:spTree>
@@ -11651,7 +11663,7 @@
 </p:notes>
 </file>
 
-<file path=ppt/notesSlides/notesSlide13.xml><?xml version="1.0" encoding="utf-8"?>
+<file path=ppt/notesSlides/notesSlide14.xml><?xml version="1.0" encoding="utf-8"?>
 <p:notes xmlns:a="http://schemas.openxmlformats.org/drawingml/2006/main" xmlns:r="http://schemas.openxmlformats.org/officeDocument/2006/relationships" xmlns:p="http://schemas.openxmlformats.org/presentationml/2006/main" showMasterSp="0" showMasterPhAnim="0">
   <p:cSld>
     <p:spTree>
@@ -12784,6 +12796,14 @@
   <p:clrMapOvr>
     <a:masterClrMapping/>
   </p:clrMapOvr>
+  <mc:AlternateContent xmlns:mc="http://schemas.openxmlformats.org/markup-compatibility/2006" xmlns:p14="http://schemas.microsoft.com/office/powerpoint/2010/main">
+    <mc:Choice Requires="p14">
+      <p:transition p14:dur="0"/>
+    </mc:Choice>
+    <mc:Fallback xmlns="">
+      <p:transition/>
+    </mc:Fallback>
+  </mc:AlternateContent>
 </p:sldLayout>
 </file>
 
@@ -13242,6 +13262,14 @@
   <p:clrMapOvr>
     <a:masterClrMapping/>
   </p:clrMapOvr>
+  <mc:AlternateContent xmlns:mc="http://schemas.openxmlformats.org/markup-compatibility/2006" xmlns:p14="http://schemas.microsoft.com/office/powerpoint/2010/main">
+    <mc:Choice Requires="p14">
+      <p:transition p14:dur="0"/>
+    </mc:Choice>
+    <mc:Fallback xmlns="">
+      <p:transition/>
+    </mc:Fallback>
+  </mc:AlternateContent>
 </p:sldLayout>
 </file>
 
@@ -13740,6 +13768,14 @@
   <p:clrMapOvr>
     <a:masterClrMapping/>
   </p:clrMapOvr>
+  <mc:AlternateContent xmlns:mc="http://schemas.openxmlformats.org/markup-compatibility/2006" xmlns:p14="http://schemas.microsoft.com/office/powerpoint/2010/main">
+    <mc:Choice Requires="p14">
+      <p:transition p14:dur="0"/>
+    </mc:Choice>
+    <mc:Fallback xmlns="">
+      <p:transition/>
+    </mc:Fallback>
+  </mc:AlternateContent>
 </p:sldLayout>
 </file>
 
@@ -13765,6 +13801,14 @@
   <p:clrMapOvr>
     <a:masterClrMapping/>
   </p:clrMapOvr>
+  <mc:AlternateContent xmlns:mc="http://schemas.openxmlformats.org/markup-compatibility/2006" xmlns:p14="http://schemas.microsoft.com/office/powerpoint/2010/main">
+    <mc:Choice Requires="p14">
+      <p:transition p14:dur="0"/>
+    </mc:Choice>
+    <mc:Fallback xmlns="">
+      <p:transition/>
+    </mc:Fallback>
+  </mc:AlternateContent>
 </p:sldLayout>
 </file>
 
@@ -13885,7 +13929,7 @@
           <a:p>
             <a:fld id="{F6B91E05-E912-B043-B600-235FCBEEACAF}" type="datetimeFigureOut">
               <a:rPr lang="en-US" smtClean="0"/>
-              <a:t>3/26/18</a:t>
+              <a:t>3/28/18</a:t>
             </a:fld>
             <a:endParaRPr lang="en-US"/>
           </a:p>
@@ -13959,6 +14003,14 @@
   <p:clrMapOvr>
     <a:masterClrMapping/>
   </p:clrMapOvr>
+  <mc:AlternateContent xmlns:mc="http://schemas.openxmlformats.org/markup-compatibility/2006" xmlns:p14="http://schemas.microsoft.com/office/powerpoint/2010/main">
+    <mc:Choice Requires="p14">
+      <p:transition p14:dur="0"/>
+    </mc:Choice>
+    <mc:Fallback xmlns="">
+      <p:transition/>
+    </mc:Fallback>
+  </mc:AlternateContent>
 </p:sldLayout>
 </file>
 
@@ -14394,9 +14446,14 @@
     <p:sldLayoutId id="2147483657" r:id="rId4"/>
     <p:sldLayoutId id="2147483659" r:id="rId5"/>
   </p:sldLayoutIdLst>
-  <p:transition>
-    <p:fade thruBlk="1"/>
-  </p:transition>
+  <mc:AlternateContent xmlns:mc="http://schemas.openxmlformats.org/markup-compatibility/2006" xmlns:p14="http://schemas.microsoft.com/office/powerpoint/2010/main">
+    <mc:Choice Requires="p14">
+      <p:transition p14:dur="0"/>
+    </mc:Choice>
+    <mc:Fallback xmlns="">
+      <p:transition/>
+    </mc:Fallback>
+  </mc:AlternateContent>
   <p:hf sldNum="0" hdr="0" ftr="0" dt="0"/>
   <p:txStyles>
     <p:titleStyle>
@@ -16756,6 +16813,14 @@
   <p:clrMapOvr>
     <a:masterClrMapping/>
   </p:clrMapOvr>
+  <mc:AlternateContent xmlns:mc="http://schemas.openxmlformats.org/markup-compatibility/2006" xmlns:p14="http://schemas.microsoft.com/office/powerpoint/2010/main">
+    <mc:Choice Requires="p14">
+      <p:transition p14:dur="0"/>
+    </mc:Choice>
+    <mc:Fallback xmlns="">
+      <p:transition/>
+    </mc:Fallback>
+  </mc:AlternateContent>
   <p:timing>
     <p:tnLst>
       <p:par>
@@ -16903,6 +16968,14 @@
   <p:clrMapOvr>
     <a:masterClrMapping/>
   </p:clrMapOvr>
+  <mc:AlternateContent xmlns:mc="http://schemas.openxmlformats.org/markup-compatibility/2006" xmlns:p14="http://schemas.microsoft.com/office/powerpoint/2010/main">
+    <mc:Choice Requires="p14">
+      <p:transition p14:dur="0"/>
+    </mc:Choice>
+    <mc:Fallback xmlns="">
+      <p:transition/>
+    </mc:Fallback>
+  </mc:AlternateContent>
   <p:timing>
     <p:tnLst>
       <p:par>
@@ -17053,6 +17126,14 @@
   <p:clrMapOvr>
     <a:masterClrMapping/>
   </p:clrMapOvr>
+  <mc:AlternateContent xmlns:mc="http://schemas.openxmlformats.org/markup-compatibility/2006" xmlns:p14="http://schemas.microsoft.com/office/powerpoint/2010/main">
+    <mc:Choice Requires="p14">
+      <p:transition p14:dur="0"/>
+    </mc:Choice>
+    <mc:Fallback xmlns="">
+      <p:transition/>
+    </mc:Fallback>
+  </mc:AlternateContent>
   <p:timing>
     <p:tnLst>
       <p:par>
@@ -17882,6 +17963,14 @@
   <p:clrMapOvr>
     <a:masterClrMapping/>
   </p:clrMapOvr>
+  <mc:AlternateContent xmlns:mc="http://schemas.openxmlformats.org/markup-compatibility/2006" xmlns:p14="http://schemas.microsoft.com/office/powerpoint/2010/main">
+    <mc:Choice Requires="p14">
+      <p:transition p14:dur="0"/>
+    </mc:Choice>
+    <mc:Fallback xmlns="">
+      <p:transition/>
+    </mc:Fallback>
+  </mc:AlternateContent>
   <p:timing>
     <p:tnLst>
       <p:par>
@@ -18604,6 +18693,14 @@
   <p:clrMapOvr>
     <a:masterClrMapping/>
   </p:clrMapOvr>
+  <mc:AlternateContent xmlns:mc="http://schemas.openxmlformats.org/markup-compatibility/2006" xmlns:p14="http://schemas.microsoft.com/office/powerpoint/2010/main">
+    <mc:Choice Requires="p14">
+      <p:transition p14:dur="0"/>
+    </mc:Choice>
+    <mc:Fallback xmlns="">
+      <p:transition/>
+    </mc:Fallback>
+  </mc:AlternateContent>
   <p:timing>
     <p:tnLst>
       <p:par>
@@ -19307,6 +19404,14 @@
   <p:clrMapOvr>
     <a:masterClrMapping/>
   </p:clrMapOvr>
+  <mc:AlternateContent xmlns:mc="http://schemas.openxmlformats.org/markup-compatibility/2006" xmlns:p14="http://schemas.microsoft.com/office/powerpoint/2010/main">
+    <mc:Choice Requires="p14">
+      <p:transition p14:dur="0"/>
+    </mc:Choice>
+    <mc:Fallback xmlns="">
+      <p:transition/>
+    </mc:Fallback>
+  </mc:AlternateContent>
   <p:timing>
     <p:tnLst>
       <p:par>
@@ -19967,6 +20072,14 @@
   <p:clrMapOvr>
     <a:masterClrMapping/>
   </p:clrMapOvr>
+  <mc:AlternateContent xmlns:mc="http://schemas.openxmlformats.org/markup-compatibility/2006" xmlns:p14="http://schemas.microsoft.com/office/powerpoint/2010/main">
+    <mc:Choice Requires="p14">
+      <p:transition p14:dur="0"/>
+    </mc:Choice>
+    <mc:Fallback xmlns="">
+      <p:transition/>
+    </mc:Fallback>
+  </mc:AlternateContent>
   <p:timing>
     <p:tnLst>
       <p:par>
@@ -20654,7 +20767,7 @@
           <p:nvPr>
             <p:extLst>
               <p:ext uri="{D42A27DB-BD31-4B8C-83A1-F6EECF244321}">
-                <p14:modId xmlns:p14="http://schemas.microsoft.com/office/powerpoint/2010/main" val="84400591"/>
+                <p14:modId xmlns:p14="http://schemas.microsoft.com/office/powerpoint/2010/main" val="1801804510"/>
               </p:ext>
             </p:extLst>
           </p:nvPr>
@@ -20676,7 +20789,7 @@
           <p:nvPr>
             <p:extLst>
               <p:ext uri="{D42A27DB-BD31-4B8C-83A1-F6EECF244321}">
-                <p14:modId xmlns:p14="http://schemas.microsoft.com/office/powerpoint/2010/main" val="1623510998"/>
+                <p14:modId xmlns:p14="http://schemas.microsoft.com/office/powerpoint/2010/main" val="1261493223"/>
               </p:ext>
             </p:extLst>
           </p:nvPr>
@@ -20701,6 +20814,14 @@
   <p:clrMapOvr>
     <a:masterClrMapping/>
   </p:clrMapOvr>
+  <mc:AlternateContent xmlns:mc="http://schemas.openxmlformats.org/markup-compatibility/2006" xmlns:p14="http://schemas.microsoft.com/office/powerpoint/2010/main">
+    <mc:Choice Requires="p14">
+      <p:transition p14:dur="0"/>
+    </mc:Choice>
+    <mc:Fallback xmlns="">
+      <p:transition/>
+    </mc:Fallback>
+  </mc:AlternateContent>
   <p:timing>
     <p:tnLst>
       <p:par>
@@ -20868,6 +20989,14 @@
   <p:clrMapOvr>
     <a:masterClrMapping/>
   </p:clrMapOvr>
+  <mc:AlternateContent xmlns:mc="http://schemas.openxmlformats.org/markup-compatibility/2006" xmlns:p14="http://schemas.microsoft.com/office/powerpoint/2010/main">
+    <mc:Choice Requires="p14">
+      <p:transition p14:dur="0"/>
+    </mc:Choice>
+    <mc:Fallback xmlns="">
+      <p:transition/>
+    </mc:Fallback>
+  </mc:AlternateContent>
   <p:timing>
     <p:tnLst>
       <p:par>
@@ -20970,7 +21099,7 @@
       </p:sp>
       <p:pic>
         <p:nvPicPr>
-          <p:cNvPr id="2" name="Picture 1"/>
+          <p:cNvPr id="3" name="Picture 2"/>
           <p:cNvPicPr>
             <a:picLocks noChangeAspect="1"/>
           </p:cNvPicPr>
@@ -20990,8 +21119,8 @@
         </p:blipFill>
         <p:spPr>
           <a:xfrm>
-            <a:off x="1321806" y="939404"/>
-            <a:ext cx="6070240" cy="3837042"/>
+            <a:off x="1267485" y="655529"/>
+            <a:ext cx="6622502" cy="4186130"/>
           </a:xfrm>
           <a:prstGeom prst="rect">
             <a:avLst/>
@@ -21008,6 +21137,14 @@
   <p:clrMapOvr>
     <a:masterClrMapping/>
   </p:clrMapOvr>
+  <mc:AlternateContent xmlns:mc="http://schemas.openxmlformats.org/markup-compatibility/2006" xmlns:p14="http://schemas.microsoft.com/office/powerpoint/2010/main">
+    <mc:Choice Requires="p14">
+      <p:transition p14:dur="0"/>
+    </mc:Choice>
+    <mc:Fallback xmlns="">
+      <p:transition/>
+    </mc:Fallback>
+  </mc:AlternateContent>
   <p:timing>
     <p:tnLst>
       <p:par>
@@ -22906,6 +23043,14 @@
   <p:clrMapOvr>
     <a:masterClrMapping/>
   </p:clrMapOvr>
+  <mc:AlternateContent xmlns:mc="http://schemas.openxmlformats.org/markup-compatibility/2006" xmlns:p14="http://schemas.microsoft.com/office/powerpoint/2010/main">
+    <mc:Choice Requires="p14">
+      <p:transition p14:dur="0"/>
+    </mc:Choice>
+    <mc:Fallback xmlns="">
+      <p:transition/>
+    </mc:Fallback>
+  </mc:AlternateContent>
   <p:timing>
     <p:tnLst>
       <p:par>
@@ -23872,6 +24017,14 @@
   <p:clrMapOvr>
     <a:masterClrMapping/>
   </p:clrMapOvr>
+  <mc:AlternateContent xmlns:mc="http://schemas.openxmlformats.org/markup-compatibility/2006" xmlns:p14="http://schemas.microsoft.com/office/powerpoint/2010/main">
+    <mc:Choice Requires="p14">
+      <p:transition p14:dur="0"/>
+    </mc:Choice>
+    <mc:Fallback xmlns="">
+      <p:transition/>
+    </mc:Fallback>
+  </mc:AlternateContent>
   <p:timing>
     <p:tnLst>
       <p:par>
@@ -23908,7 +24061,7 @@
           <p:nvPr>
             <p:extLst>
               <p:ext uri="{D42A27DB-BD31-4B8C-83A1-F6EECF244321}">
-                <p14:modId xmlns:p14="http://schemas.microsoft.com/office/powerpoint/2010/main" val="116469110"/>
+                <p14:modId xmlns:p14="http://schemas.microsoft.com/office/powerpoint/2010/main" val="429709703"/>
               </p:ext>
             </p:extLst>
           </p:nvPr>
@@ -24302,67 +24455,43 @@
                     <a:p>
                       <a:pPr algn="ctr" rtl="0" fontAlgn="b"/>
                       <a:r>
-                        <a:rPr lang="mr-IN" sz="1500" dirty="0" err="1">
+                        <a:rPr lang="en-US" sz="1400" b="0" i="0" u="none" strike="noStrike" cap="none" dirty="0" smtClean="0">
+                          <a:solidFill>
+                            <a:schemeClr val="tx1"/>
+                          </a:solidFill>
                           <a:effectLst/>
                           <a:latin typeface="Book Antiqua" charset="0"/>
                           <a:ea typeface="Book Antiqua" charset="0"/>
                           <a:cs typeface="Book Antiqua" charset="0"/>
+                          <a:sym typeface="Arial"/>
                         </a:rPr>
-                        <a:t>num_class</a:t>
+                        <a:t>distribution = "multinomial", </a:t>
                       </a:r>
                       <a:r>
-                        <a:rPr lang="mr-IN" sz="1500" dirty="0">
+                        <a:rPr lang="en-US" sz="1400" b="0" i="0" u="none" strike="noStrike" cap="none" dirty="0" err="1" smtClean="0">
+                          <a:solidFill>
+                            <a:schemeClr val="tx1"/>
+                          </a:solidFill>
                           <a:effectLst/>
                           <a:latin typeface="Book Antiqua" charset="0"/>
                           <a:ea typeface="Book Antiqua" charset="0"/>
                           <a:cs typeface="Book Antiqua" charset="0"/>
+                          <a:sym typeface="Arial"/>
                         </a:rPr>
-                        <a:t>"=3,"eta</a:t>
+                        <a:t>n.trees</a:t>
                       </a:r>
                       <a:r>
-                        <a:rPr lang="mr-IN" sz="1500" dirty="0" smtClean="0">
+                        <a:rPr lang="en-US" sz="1400" b="0" i="0" u="none" strike="noStrike" cap="none" dirty="0" smtClean="0">
+                          <a:solidFill>
+                            <a:schemeClr val="tx1"/>
+                          </a:solidFill>
                           <a:effectLst/>
                           <a:latin typeface="Book Antiqua" charset="0"/>
                           <a:ea typeface="Book Antiqua" charset="0"/>
                           <a:cs typeface="Book Antiqua" charset="0"/>
+                          <a:sym typeface="Arial"/>
                         </a:rPr>
-                        <a:t>"=</a:t>
-                      </a:r>
-                      <a:r>
-                        <a:rPr lang="en-US" sz="1500" dirty="0" smtClean="0">
-                          <a:effectLst/>
-                          <a:latin typeface="Book Antiqua" charset="0"/>
-                          <a:ea typeface="Book Antiqua" charset="0"/>
-                          <a:cs typeface="Book Antiqua" charset="0"/>
-                        </a:rPr>
-                        <a:t>0</a:t>
-                      </a:r>
-                      <a:r>
-                        <a:rPr lang="mr-IN" sz="1500" dirty="0" smtClean="0">
-                          <a:effectLst/>
-                          <a:latin typeface="Book Antiqua" charset="0"/>
-                          <a:ea typeface="Book Antiqua" charset="0"/>
-                          <a:cs typeface="Book Antiqua" charset="0"/>
-                        </a:rPr>
-                        <a:t>.1</a:t>
-                      </a:r>
-                      <a:r>
-                        <a:rPr lang="mr-IN" sz="1500" dirty="0">
-                          <a:effectLst/>
-                          <a:latin typeface="Book Antiqua" charset="0"/>
-                          <a:ea typeface="Book Antiqua" charset="0"/>
-                          <a:cs typeface="Book Antiqua" charset="0"/>
-                        </a:rPr>
-                        <a:t>,"max_depth"=4,"nround"=</a:t>
-                      </a:r>
-                      <a:r>
-                        <a:rPr lang="mr-IN" sz="1500" dirty="0" smtClean="0">
-                          <a:effectLst/>
-                          <a:latin typeface="Book Antiqua" charset="0"/>
-                          <a:ea typeface="Book Antiqua" charset="0"/>
-                          <a:cs typeface="Book Antiqua" charset="0"/>
-                        </a:rPr>
-                        <a:t>250</a:t>
+                        <a:t> = 441, shrinkage = .1</a:t>
                       </a:r>
                       <a:endParaRPr lang="mr-IN" sz="1500" dirty="0">
                         <a:effectLst/>
@@ -24744,7 +24873,7 @@
           <p:nvPr/>
         </p:nvPicPr>
         <p:blipFill>
-          <a:blip r:embed="rId2">
+          <a:blip r:embed="rId3">
             <a:extLst>
               <a:ext uri="{28A0092B-C50C-407E-A947-70E740481C1C}">
                 <a14:useLocalDpi xmlns:a14="http://schemas.microsoft.com/office/drawing/2010/main" val="0"/>
@@ -24775,6 +24904,14 @@
   <p:clrMapOvr>
     <a:masterClrMapping/>
   </p:clrMapOvr>
+  <mc:AlternateContent xmlns:mc="http://schemas.openxmlformats.org/markup-compatibility/2006" xmlns:p14="http://schemas.microsoft.com/office/powerpoint/2010/main">
+    <mc:Choice Requires="p14">
+      <p:transition p14:dur="0"/>
+    </mc:Choice>
+    <mc:Fallback xmlns="">
+      <p:transition/>
+    </mc:Fallback>
+  </mc:AlternateContent>
   <p:timing>
     <p:tnLst>
       <p:par>
@@ -26677,6 +26814,14 @@
   <p:clrMapOvr>
     <a:masterClrMapping/>
   </p:clrMapOvr>
+  <mc:AlternateContent xmlns:mc="http://schemas.openxmlformats.org/markup-compatibility/2006" xmlns:p14="http://schemas.microsoft.com/office/powerpoint/2010/main">
+    <mc:Choice Requires="p14">
+      <p:transition p14:dur="0"/>
+    </mc:Choice>
+    <mc:Fallback xmlns="">
+      <p:transition/>
+    </mc:Fallback>
+  </mc:AlternateContent>
   <p:timing>
     <p:tnLst>
       <p:par>
@@ -26798,6 +26943,14 @@
   <p:clrMapOvr>
     <a:masterClrMapping/>
   </p:clrMapOvr>
+  <mc:AlternateContent xmlns:mc="http://schemas.openxmlformats.org/markup-compatibility/2006" xmlns:p14="http://schemas.microsoft.com/office/powerpoint/2010/main">
+    <mc:Choice Requires="p14">
+      <p:transition p14:dur="0"/>
+    </mc:Choice>
+    <mc:Fallback xmlns="">
+      <p:transition/>
+    </mc:Fallback>
+  </mc:AlternateContent>
   <p:timing>
     <p:tnLst>
       <p:par>
@@ -27616,6 +27769,14 @@
   <p:clrMapOvr>
     <a:masterClrMapping/>
   </p:clrMapOvr>
+  <mc:AlternateContent xmlns:mc="http://schemas.openxmlformats.org/markup-compatibility/2006" xmlns:p14="http://schemas.microsoft.com/office/powerpoint/2010/main">
+    <mc:Choice Requires="p14">
+      <p:transition p14:dur="0"/>
+    </mc:Choice>
+    <mc:Fallback xmlns="">
+      <p:transition/>
+    </mc:Fallback>
+  </mc:AlternateContent>
   <p:timing>
     <p:tnLst>
       <p:par>
@@ -29509,6 +29670,14 @@
   <p:clrMapOvr>
     <a:masterClrMapping/>
   </p:clrMapOvr>
+  <mc:AlternateContent xmlns:mc="http://schemas.openxmlformats.org/markup-compatibility/2006" xmlns:p14="http://schemas.microsoft.com/office/powerpoint/2010/main">
+    <mc:Choice Requires="p14">
+      <p:transition p14:dur="0"/>
+    </mc:Choice>
+    <mc:Fallback xmlns="">
+      <p:transition/>
+    </mc:Fallback>
+  </mc:AlternateContent>
   <p:timing>
     <p:tnLst>
       <p:par>
@@ -30129,6 +30298,14 @@
   <p:clrMapOvr>
     <a:masterClrMapping/>
   </p:clrMapOvr>
+  <mc:AlternateContent xmlns:mc="http://schemas.openxmlformats.org/markup-compatibility/2006" xmlns:p14="http://schemas.microsoft.com/office/powerpoint/2010/main">
+    <mc:Choice Requires="p14">
+      <p:transition p14:dur="0"/>
+    </mc:Choice>
+    <mc:Fallback xmlns="">
+      <p:transition/>
+    </mc:Fallback>
+  </mc:AlternateContent>
   <p:timing>
     <p:tnLst>
       <p:par>
@@ -32027,6 +32204,14 @@
   <p:clrMapOvr>
     <a:masterClrMapping/>
   </p:clrMapOvr>
+  <mc:AlternateContent xmlns:mc="http://schemas.openxmlformats.org/markup-compatibility/2006" xmlns:p14="http://schemas.microsoft.com/office/powerpoint/2010/main">
+    <mc:Choice Requires="p14">
+      <p:transition p14:dur="0"/>
+    </mc:Choice>
+    <mc:Fallback xmlns="">
+      <p:transition/>
+    </mc:Fallback>
+  </mc:AlternateContent>
   <p:timing>
     <p:tnLst>
       <p:par>
@@ -32435,6 +32620,14 @@
   <p:clrMapOvr>
     <a:masterClrMapping/>
   </p:clrMapOvr>
+  <mc:AlternateContent xmlns:mc="http://schemas.openxmlformats.org/markup-compatibility/2006" xmlns:p14="http://schemas.microsoft.com/office/powerpoint/2010/main">
+    <mc:Choice Requires="p14">
+      <p:transition p14:dur="0"/>
+    </mc:Choice>
+    <mc:Fallback xmlns="">
+      <p:transition/>
+    </mc:Fallback>
+  </mc:AlternateContent>
   <p:timing>
     <p:tnLst>
       <p:par>
@@ -38291,6 +38484,14 @@
   <p:clrMapOvr>
     <a:masterClrMapping/>
   </p:clrMapOvr>
+  <mc:AlternateContent xmlns:mc="http://schemas.openxmlformats.org/markup-compatibility/2006" xmlns:p14="http://schemas.microsoft.com/office/powerpoint/2010/main">
+    <mc:Choice Requires="p14">
+      <p:transition p14:dur="0"/>
+    </mc:Choice>
+    <mc:Fallback xmlns="">
+      <p:transition/>
+    </mc:Fallback>
+  </mc:AlternateContent>
   <p:timing>
     <p:tnLst>
       <p:par>
@@ -38745,6 +38946,14 @@
   <p:clrMapOvr>
     <a:masterClrMapping/>
   </p:clrMapOvr>
+  <mc:AlternateContent xmlns:mc="http://schemas.openxmlformats.org/markup-compatibility/2006" xmlns:p14="http://schemas.microsoft.com/office/powerpoint/2010/main">
+    <mc:Choice Requires="p14">
+      <p:transition p14:dur="0"/>
+    </mc:Choice>
+    <mc:Fallback xmlns="">
+      <p:transition/>
+    </mc:Fallback>
+  </mc:AlternateContent>
   <p:timing>
     <p:tnLst>
       <p:par>
@@ -39208,6 +39417,14 @@
   <p:clrMapOvr>
     <a:masterClrMapping/>
   </p:clrMapOvr>
+  <mc:AlternateContent xmlns:mc="http://schemas.openxmlformats.org/markup-compatibility/2006" xmlns:p14="http://schemas.microsoft.com/office/powerpoint/2010/main">
+    <mc:Choice Requires="p14">
+      <p:transition p14:dur="0"/>
+    </mc:Choice>
+    <mc:Fallback xmlns="">
+      <p:transition/>
+    </mc:Fallback>
+  </mc:AlternateContent>
   <p:timing>
     <p:tnLst>
       <p:par>

</xml_diff>